<commit_message>
Adjust which drivers to filter
</commit_message>
<xml_diff>
--- a/src/presentation/final_presentation.pptx
+++ b/src/presentation/final_presentation.pptx
@@ -18,6 +18,7 @@
     <p:sldId id="266" r:id="rId12"/>
     <p:sldId id="267" r:id="rId13"/>
     <p:sldId id="268" r:id="rId14"/>
+    <p:sldId id="269" r:id="rId15"/>
   </p:sldIdLst>
   <p:sldSz cx="12192000" cy="6858000"/>
   <p:notesSz cx="6858000" cy="9144000"/>
@@ -3809,8 +3810,8 @@
         </p:nvSpPr>
         <p:spPr>
           <a:xfrm>
-            <a:off x="521208" y="877824"/>
-            <a:ext cx="10515600" cy="1325880"/>
+            <a:off x="603504" y="0"/>
+            <a:ext cx="10753344" cy="1207008"/>
           </a:xfrm>
         </p:spPr>
         <p:txBody>
@@ -3822,15 +3823,32 @@
             </a:pPr>
             <a:r>
               <a:rPr/>
-              <a:t>Backup</a:t>
-            </a:r>
-            <a:r>
-              <a:rPr/>
-              <a:t> </a:t>
-            </a:r>
-            <a:r>
-              <a:rPr/>
-              <a:t>slides</a:t>
+              <a:t>Conclusions</a:t>
+            </a:r>
+          </a:p>
+        </p:txBody>
+      </p:sp>
+      <p:sp>
+        <p:nvSpPr>
+          <p:cNvPr id="3" name="Content Placeholder 2"/>
+          <p:cNvSpPr>
+            <a:spLocks noGrp="1"/>
+          </p:cNvSpPr>
+          <p:nvPr>
+            <p:ph idx="1"/>
+          </p:nvPr>
+        </p:nvSpPr>
+        <p:spPr/>
+        <p:txBody>
+          <a:bodyPr/>
+          <a:lstStyle/>
+          <a:p>
+            <a:pPr lvl="0" marL="0" indent="0">
+              <a:buNone/>
+            </a:pPr>
+            <a:r>
+              <a:rPr/>
+              <a:t>Texting effect</a:t>
             </a:r>
           </a:p>
         </p:txBody>
@@ -3869,8 +3887,8 @@
         </p:nvSpPr>
         <p:spPr>
           <a:xfrm>
-            <a:off x="603504" y="0"/>
-            <a:ext cx="10753344" cy="1207008"/>
+            <a:off x="521208" y="877824"/>
+            <a:ext cx="10515600" cy="1325880"/>
           </a:xfrm>
         </p:spPr>
         <p:txBody>
@@ -3882,63 +3900,15 @@
             </a:pPr>
             <a:r>
               <a:rPr/>
-              <a:t>References</a:t>
-            </a:r>
-          </a:p>
-        </p:txBody>
-      </p:sp>
-      <p:sp>
-        <p:nvSpPr>
-          <p:cNvPr id="3" name="Content Placeholder 2"/>
-          <p:cNvSpPr>
-            <a:spLocks noGrp="1"/>
-          </p:cNvSpPr>
-          <p:nvPr>
-            <p:ph idx="1"/>
-          </p:nvPr>
-        </p:nvSpPr>
-        <p:spPr/>
-        <p:txBody>
-          <a:bodyPr/>
-          <a:lstStyle/>
-          <a:p>
-            <a:pPr lvl="1">
-              <a:buAutoNum type="arabicPeriod"/>
-            </a:pPr>
-            <a:r>
-              <a:rPr/>
-              <a:t>Taamneh, S. et al. A multimodal dataset for various forms of distracted driving. Sci. Data 4:170110 doi: 10.1038/sdata.2017.110 (2017).</a:t>
-            </a:r>
-          </a:p>
-          <a:p>
-            <a:pPr lvl="1">
-              <a:buAutoNum type="arabicPeriod"/>
-            </a:pPr>
-            <a:r>
-              <a:rPr/>
-              <a:t>Betancourt, Michael. 2018. “A Principled Bayesian Workflow” June 2018</a:t>
-            </a:r>
-          </a:p>
-          <a:p>
-            <a:pPr lvl="1">
-              <a:buAutoNum type="arabicPeriod"/>
-            </a:pPr>
-            <a:r>
-              <a:rPr/>
-              <a:t>Kim, Shephard, Chib (1998) “Stochastic Volatility: Likelihood Inference and Comparison with ARCH Models” </a:t>
-            </a:r>
-            <a:r>
-              <a:rPr i="1"/>
-              <a:t>The Review of Economic Studies Vol. 65, No. 3</a:t>
-            </a:r>
-          </a:p>
-          <a:p>
-            <a:pPr lvl="1">
-              <a:buAutoNum type="arabicPeriod"/>
-            </a:pPr>
-            <a:r>
-              <a:rPr/>
-              <a:t>Stan Development Team. “Stan Modeling Language User’s Guide and Reference Manual” Version 2.17.0, Sept 2017</a:t>
+              <a:t>Backup</a:t>
+            </a:r>
+            <a:r>
+              <a:rPr/>
+              <a:t> </a:t>
+            </a:r>
+            <a:r>
+              <a:rPr/>
+              <a:t>slides</a:t>
             </a:r>
           </a:p>
         </p:txBody>
@@ -3990,31 +3960,7 @@
             </a:pPr>
             <a:r>
               <a:rPr/>
-              <a:t>Computing</a:t>
-            </a:r>
-            <a:r>
-              <a:rPr/>
-              <a:t> </a:t>
-            </a:r>
-            <a:r>
-              <a:rPr/>
-              <a:t>Cluster</a:t>
-            </a:r>
-            <a:r>
-              <a:rPr/>
-              <a:t> </a:t>
-            </a:r>
-            <a:r>
-              <a:rPr/>
-              <a:t>Setup</a:t>
-            </a:r>
-            <a:r>
-              <a:rPr/>
-              <a:t> </a:t>
-            </a:r>
-            <a:r>
-              <a:rPr/>
-              <a:t>(AWS)</a:t>
+              <a:t>References</a:t>
             </a:r>
           </a:p>
         </p:txBody>
@@ -4034,66 +3980,43 @@
           <a:bodyPr/>
           <a:lstStyle/>
           <a:p>
-            <a:pPr lvl="0" marL="0" indent="0">
-              <a:spcBef>
-                <a:spcPts val="3000"/>
-              </a:spcBef>
-              <a:buNone/>
+            <a:pPr lvl="1">
+              <a:buAutoNum type="arabicPeriod"/>
             </a:pPr>
             <a:r>
-              <a:rPr b="1"/>
-              <a:t>Prior Predictive Modelling</a:t>
-            </a:r>
-          </a:p>
-          <a:p>
-            <a:pPr lvl="1"/>
-            <a:r>
-              <a:rPr/>
-              <a:t>Each prior predictive model ran 1000 simulations from the generative model</a:t>
-            </a:r>
-          </a:p>
-          <a:p>
-            <a:pPr lvl="1"/>
-            <a:r>
-              <a:rPr/>
-              <a:t>Fitting 1000 simulations is a time consuming process on local machine</a:t>
-            </a:r>
-          </a:p>
-          <a:p>
-            <a:pPr lvl="2"/>
-            <a:r>
-              <a:rPr sz="1800">
-                <a:latin typeface="Courier"/>
-              </a:rPr>
-              <a:t>Stan</a:t>
-            </a:r>
-            <a:r>
-              <a:rPr/>
-              <a:t> runs 4 markov chains in parallel and aggregates (4 cores)</a:t>
-            </a:r>
-          </a:p>
-          <a:p>
-            <a:pPr lvl="2"/>
-            <a:r>
-              <a:rPr/>
-              <a:t>1000 * 4 = 4000 CPU’s to run fit observations for one model!</a:t>
-            </a:r>
-          </a:p>
-          <a:p>
-            <a:pPr lvl="1"/>
-            <a:r>
-              <a:rPr/>
-              <a:t>Created a docker container with </a:t>
-            </a:r>
-            <a:r>
-              <a:rPr sz="1800">
-                <a:latin typeface="Courier"/>
-              </a:rPr>
-              <a:t>RStan</a:t>
-            </a:r>
-            <a:r>
-              <a:rPr/>
-              <a:t> and submitted jobs to AWS Batch service</a:t>
+              <a:rPr/>
+              <a:t>Taamneh, S. et al. A multimodal dataset for various forms of distracted driving. Sci. Data 4:170110 doi: 10.1038/sdata.2017.110 (2017).</a:t>
+            </a:r>
+          </a:p>
+          <a:p>
+            <a:pPr lvl="1">
+              <a:buAutoNum type="arabicPeriod"/>
+            </a:pPr>
+            <a:r>
+              <a:rPr/>
+              <a:t>Betancourt, Michael. 2018. “A Principled Bayesian Workflow” June 2018</a:t>
+            </a:r>
+          </a:p>
+          <a:p>
+            <a:pPr lvl="1">
+              <a:buAutoNum type="arabicPeriod"/>
+            </a:pPr>
+            <a:r>
+              <a:rPr/>
+              <a:t>Kim, Shephard, Chib (1998) “Stochastic Volatility: Likelihood Inference and Comparison with ARCH Models” </a:t>
+            </a:r>
+            <a:r>
+              <a:rPr i="1"/>
+              <a:t>The Review of Economic Studies Vol. 65, No. 3</a:t>
+            </a:r>
+          </a:p>
+          <a:p>
+            <a:pPr lvl="1">
+              <a:buAutoNum type="arabicPeriod"/>
+            </a:pPr>
+            <a:r>
+              <a:rPr/>
+              <a:t>Stan Development Team. “Stan Modeling Language User’s Guide and Reference Manual” Version 2.17.0, Sept 2017</a:t>
             </a:r>
           </a:p>
         </p:txBody>
@@ -4104,6 +4027,161 @@
 </file>
 
 <file path=ppt/slides/slide13.xml><?xml version="1.0" encoding="utf-8"?>
+<p:sld xmlns:a="http://schemas.openxmlformats.org/drawingml/2006/main" xmlns:r="http://schemas.openxmlformats.org/officeDocument/2006/relationships" xmlns:p="http://schemas.openxmlformats.org/presentationml/2006/main">
+  <p:cSld>
+    <p:spTree>
+      <p:nvGrpSpPr>
+        <p:cNvPr id="1" name=""/>
+        <p:cNvGrpSpPr/>
+        <p:nvPr/>
+      </p:nvGrpSpPr>
+      <p:grpSpPr>
+        <a:xfrm>
+          <a:off x="0" y="0"/>
+          <a:ext cx="0" cy="0"/>
+          <a:chOff x="0" y="0"/>
+          <a:chExt cx="0" cy="0"/>
+        </a:xfrm>
+      </p:grpSpPr>
+      <p:sp>
+        <p:nvSpPr>
+          <p:cNvPr id="2" name="Title 1"/>
+          <p:cNvSpPr>
+            <a:spLocks noGrp="1"/>
+          </p:cNvSpPr>
+          <p:nvPr>
+            <p:ph type="title"/>
+          </p:nvPr>
+        </p:nvSpPr>
+        <p:spPr>
+          <a:xfrm>
+            <a:off x="603504" y="0"/>
+            <a:ext cx="10753344" cy="1207008"/>
+          </a:xfrm>
+        </p:spPr>
+        <p:txBody>
+          <a:bodyPr/>
+          <a:lstStyle/>
+          <a:p>
+            <a:pPr lvl="0" marL="0" indent="0">
+              <a:buNone/>
+            </a:pPr>
+            <a:r>
+              <a:rPr/>
+              <a:t>Computing</a:t>
+            </a:r>
+            <a:r>
+              <a:rPr/>
+              <a:t> </a:t>
+            </a:r>
+            <a:r>
+              <a:rPr/>
+              <a:t>Cluster</a:t>
+            </a:r>
+            <a:r>
+              <a:rPr/>
+              <a:t> </a:t>
+            </a:r>
+            <a:r>
+              <a:rPr/>
+              <a:t>Setup</a:t>
+            </a:r>
+            <a:r>
+              <a:rPr/>
+              <a:t> </a:t>
+            </a:r>
+            <a:r>
+              <a:rPr/>
+              <a:t>(AWS)</a:t>
+            </a:r>
+          </a:p>
+        </p:txBody>
+      </p:sp>
+      <p:sp>
+        <p:nvSpPr>
+          <p:cNvPr id="3" name="Content Placeholder 2"/>
+          <p:cNvSpPr>
+            <a:spLocks noGrp="1"/>
+          </p:cNvSpPr>
+          <p:nvPr>
+            <p:ph idx="1"/>
+          </p:nvPr>
+        </p:nvSpPr>
+        <p:spPr/>
+        <p:txBody>
+          <a:bodyPr/>
+          <a:lstStyle/>
+          <a:p>
+            <a:pPr lvl="0" marL="0" indent="0">
+              <a:spcBef>
+                <a:spcPts val="3000"/>
+              </a:spcBef>
+              <a:buNone/>
+            </a:pPr>
+            <a:r>
+              <a:rPr b="1"/>
+              <a:t>Prior Predictive Modelling</a:t>
+            </a:r>
+          </a:p>
+          <a:p>
+            <a:pPr lvl="1"/>
+            <a:r>
+              <a:rPr/>
+              <a:t>Each prior predictive model ran 1000 simulations from the generative model</a:t>
+            </a:r>
+          </a:p>
+          <a:p>
+            <a:pPr lvl="1"/>
+            <a:r>
+              <a:rPr/>
+              <a:t>Fitting 1000 simulations is a time consuming process on local machine</a:t>
+            </a:r>
+          </a:p>
+          <a:p>
+            <a:pPr lvl="2"/>
+            <a:r>
+              <a:rPr sz="1800">
+                <a:latin typeface="Courier"/>
+              </a:rPr>
+              <a:t>Stan</a:t>
+            </a:r>
+            <a:r>
+              <a:rPr/>
+              <a:t> runs 4 markov chains in parallel and aggregates (4 cores)</a:t>
+            </a:r>
+          </a:p>
+          <a:p>
+            <a:pPr lvl="2"/>
+            <a:r>
+              <a:rPr/>
+              <a:t>1000 * 4 = 4000 CPU’s to run fit observations for one model!</a:t>
+            </a:r>
+          </a:p>
+          <a:p>
+            <a:pPr lvl="1"/>
+            <a:r>
+              <a:rPr/>
+              <a:t>Created a docker container with </a:t>
+            </a:r>
+            <a:r>
+              <a:rPr sz="1800">
+                <a:latin typeface="Courier"/>
+              </a:rPr>
+              <a:t>RStan</a:t>
+            </a:r>
+            <a:r>
+              <a:rPr/>
+              <a:t> and submitted jobs to AWS Batch service</a:t>
+            </a:r>
+          </a:p>
+        </p:txBody>
+      </p:sp>
+    </p:spTree>
+  </p:cSld>
+</p:sld>
+</file>
+
+<file path=ppt/slides/slide14.xml><?xml version="1.0" encoding="utf-8"?>
 <p:sld xmlns:a="http://schemas.openxmlformats.org/drawingml/2006/main" xmlns:r="http://schemas.openxmlformats.org/officeDocument/2006/relationships" xmlns:p="http://schemas.openxmlformats.org/presentationml/2006/main">
   <p:cSld>
     <p:spTree>
@@ -6240,6 +6318,15 @@
                       </m:r>
                       <m:r>
                         <m:t>)</m:t>
+                      </m:r>
+                      <m:r>
+                        <m:t>:</m:t>
+                      </m:r>
+                      <m:r>
+                        <m:rPr>
+                          <m:sty m:val="p"/>
+                        </m:rPr>
+                        <m:t>White noise shock</m:t>
                       </m:r>
                     </m:oMath>
                   </m:oMathPara>

</xml_diff>